<commit_message>
Update 22 05 28
</commit_message>
<xml_diff>
--- a/DATOS COVID Chile 2022 05 21.pptx
+++ b/DATOS COVID Chile 2022 05 21.pptx
@@ -5,7 +5,7 @@
     <p:sldMasterId id="2147483648" r:id="rId1"/>
   </p:sldMasterIdLst>
   <p:notesMasterIdLst>
-    <p:notesMasterId r:id="rId29"/>
+    <p:notesMasterId r:id="rId30"/>
   </p:notesMasterIdLst>
   <p:sldIdLst>
     <p:sldId id="266" r:id="rId2"/>
@@ -28,13 +28,14 @@
     <p:sldId id="431" r:id="rId19"/>
     <p:sldId id="438" r:id="rId20"/>
     <p:sldId id="407" r:id="rId21"/>
-    <p:sldId id="481" r:id="rId22"/>
-    <p:sldId id="482" r:id="rId23"/>
-    <p:sldId id="470" r:id="rId24"/>
-    <p:sldId id="496" r:id="rId25"/>
-    <p:sldId id="483" r:id="rId26"/>
-    <p:sldId id="424" r:id="rId27"/>
-    <p:sldId id="493" r:id="rId28"/>
+    <p:sldId id="501" r:id="rId22"/>
+    <p:sldId id="481" r:id="rId23"/>
+    <p:sldId id="482" r:id="rId24"/>
+    <p:sldId id="470" r:id="rId25"/>
+    <p:sldId id="496" r:id="rId26"/>
+    <p:sldId id="483" r:id="rId27"/>
+    <p:sldId id="424" r:id="rId28"/>
+    <p:sldId id="493" r:id="rId29"/>
   </p:sldIdLst>
   <p:sldSz cx="12192000" cy="6858000"/>
   <p:notesSz cx="6858000" cy="9144000"/>
@@ -6901,10 +6902,10 @@
       </p:grpSpPr>
       <p:pic>
         <p:nvPicPr>
-          <p:cNvPr id="2" name="Picture 1">
-            <a:extLst>
-              <a:ext uri="{FF2B5EF4-FFF2-40B4-BE49-F238E27FC236}">
-                <a16:creationId xmlns:a16="http://schemas.microsoft.com/office/drawing/2014/main" id="{CED64771-8010-AEA6-3632-5930493A1BBD}"/>
+          <p:cNvPr id="3" name="Picture 2">
+            <a:extLst>
+              <a:ext uri="{FF2B5EF4-FFF2-40B4-BE49-F238E27FC236}">
+                <a16:creationId xmlns:a16="http://schemas.microsoft.com/office/drawing/2014/main" id="{5BA69343-EE4E-3106-F6EB-7FE7C0C94239}"/>
               </a:ext>
             </a:extLst>
           </p:cNvPr>
@@ -6921,18 +6922,53 @@
         </p:blipFill>
         <p:spPr>
           <a:xfrm>
-            <a:off x="1825879" y="131458"/>
-            <a:ext cx="8540242" cy="6245591"/>
+            <a:off x="432361" y="501297"/>
+            <a:ext cx="11079107" cy="5855405"/>
           </a:xfrm>
           <a:prstGeom prst="rect">
             <a:avLst/>
           </a:prstGeom>
         </p:spPr>
       </p:pic>
+      <p:sp>
+        <p:nvSpPr>
+          <p:cNvPr id="4" name="TextBox 3">
+            <a:extLst>
+              <a:ext uri="{FF2B5EF4-FFF2-40B4-BE49-F238E27FC236}">
+                <a16:creationId xmlns:a16="http://schemas.microsoft.com/office/drawing/2014/main" id="{37BA5136-5472-F368-7D32-88B634ADC00D}"/>
+              </a:ext>
+            </a:extLst>
+          </p:cNvPr>
+          <p:cNvSpPr txBox="1"/>
+          <p:nvPr/>
+        </p:nvSpPr>
+        <p:spPr>
+          <a:xfrm>
+            <a:off x="446056" y="0"/>
+            <a:ext cx="11299888" cy="461665"/>
+          </a:xfrm>
+          <a:prstGeom prst="rect">
+            <a:avLst/>
+          </a:prstGeom>
+          <a:noFill/>
+        </p:spPr>
+        <p:txBody>
+          <a:bodyPr wrap="none" rtlCol="0">
+            <a:spAutoFit/>
+          </a:bodyPr>
+          <a:lstStyle/>
+          <a:p>
+            <a:r>
+              <a:rPr lang="en-CL" sz="2400" dirty="0"/>
+              <a:t>30 comunas (sobre 50K habs) con mayor incidencia de nuevos casos x 100 mil habitantes </a:t>
+            </a:r>
+          </a:p>
+        </p:txBody>
+      </p:sp>
     </p:spTree>
     <p:extLst>
       <p:ext uri="{BB962C8B-B14F-4D97-AF65-F5344CB8AC3E}">
-        <p14:creationId xmlns:p14="http://schemas.microsoft.com/office/powerpoint/2010/main" val="3061046785"/>
+        <p14:creationId xmlns:p14="http://schemas.microsoft.com/office/powerpoint/2010/main" val="987915541"/>
       </p:ext>
     </p:extLst>
   </p:cSld>
@@ -6959,55 +6995,12 @@
           <a:chExt cx="0" cy="0"/>
         </a:xfrm>
       </p:grpSpPr>
-      <p:sp>
-        <p:nvSpPr>
-          <p:cNvPr id="2" name="TextBox 1">
-            <a:extLst>
-              <a:ext uri="{FF2B5EF4-FFF2-40B4-BE49-F238E27FC236}">
-                <a16:creationId xmlns:a16="http://schemas.microsoft.com/office/drawing/2014/main" id="{6D62C78C-F39F-A39D-4840-F2484C4FDBED}"/>
-              </a:ext>
-            </a:extLst>
-          </p:cNvPr>
-          <p:cNvSpPr txBox="1"/>
-          <p:nvPr/>
-        </p:nvSpPr>
-        <p:spPr>
-          <a:xfrm>
-            <a:off x="3745837" y="83127"/>
-            <a:ext cx="4700326" cy="584775"/>
-          </a:xfrm>
-          <a:prstGeom prst="rect">
-            <a:avLst/>
-          </a:prstGeom>
-          <a:noFill/>
-        </p:spPr>
-        <p:txBody>
-          <a:bodyPr wrap="none" rtlCol="0">
-            <a:spAutoFit/>
-          </a:bodyPr>
-          <a:lstStyle/>
-          <a:p>
-            <a:r>
-              <a:rPr lang="en-CL" sz="3200" dirty="0"/>
-              <a:t>Ocupación N</a:t>
-            </a:r>
-            <a:r>
-              <a:rPr lang="en-US" sz="3200" dirty="0"/>
-              <a:t>a</a:t>
-            </a:r>
-            <a:r>
-              <a:rPr lang="en-CL" sz="3200" dirty="0"/>
-              <a:t>cional de UCI</a:t>
-            </a:r>
-          </a:p>
-        </p:txBody>
-      </p:sp>
       <p:pic>
         <p:nvPicPr>
-          <p:cNvPr id="3" name="Picture 2">
-            <a:extLst>
-              <a:ext uri="{FF2B5EF4-FFF2-40B4-BE49-F238E27FC236}">
-                <a16:creationId xmlns:a16="http://schemas.microsoft.com/office/drawing/2014/main" id="{66AF7585-3C16-EF6F-8A4D-D9DDF7337E1B}"/>
+          <p:cNvPr id="2" name="Picture 1">
+            <a:extLst>
+              <a:ext uri="{FF2B5EF4-FFF2-40B4-BE49-F238E27FC236}">
+                <a16:creationId xmlns:a16="http://schemas.microsoft.com/office/drawing/2014/main" id="{CED64771-8010-AEA6-3632-5930493A1BBD}"/>
               </a:ext>
             </a:extLst>
           </p:cNvPr>
@@ -7024,8 +7017,8 @@
         </p:blipFill>
         <p:spPr>
           <a:xfrm>
-            <a:off x="1414824" y="774779"/>
-            <a:ext cx="9362351" cy="5780399"/>
+            <a:off x="1825879" y="131458"/>
+            <a:ext cx="8540242" cy="6245591"/>
           </a:xfrm>
           <a:prstGeom prst="rect">
             <a:avLst/>
@@ -7035,7 +7028,7 @@
     </p:spTree>
     <p:extLst>
       <p:ext uri="{BB962C8B-B14F-4D97-AF65-F5344CB8AC3E}">
-        <p14:creationId xmlns:p14="http://schemas.microsoft.com/office/powerpoint/2010/main" val="696864501"/>
+        <p14:creationId xmlns:p14="http://schemas.microsoft.com/office/powerpoint/2010/main" val="3061046785"/>
       </p:ext>
     </p:extLst>
   </p:cSld>
@@ -7062,12 +7055,55 @@
           <a:chExt cx="0" cy="0"/>
         </a:xfrm>
       </p:grpSpPr>
+      <p:sp>
+        <p:nvSpPr>
+          <p:cNvPr id="2" name="TextBox 1">
+            <a:extLst>
+              <a:ext uri="{FF2B5EF4-FFF2-40B4-BE49-F238E27FC236}">
+                <a16:creationId xmlns:a16="http://schemas.microsoft.com/office/drawing/2014/main" id="{6D62C78C-F39F-A39D-4840-F2484C4FDBED}"/>
+              </a:ext>
+            </a:extLst>
+          </p:cNvPr>
+          <p:cNvSpPr txBox="1"/>
+          <p:nvPr/>
+        </p:nvSpPr>
+        <p:spPr>
+          <a:xfrm>
+            <a:off x="3745837" y="83127"/>
+            <a:ext cx="4700326" cy="584775"/>
+          </a:xfrm>
+          <a:prstGeom prst="rect">
+            <a:avLst/>
+          </a:prstGeom>
+          <a:noFill/>
+        </p:spPr>
+        <p:txBody>
+          <a:bodyPr wrap="none" rtlCol="0">
+            <a:spAutoFit/>
+          </a:bodyPr>
+          <a:lstStyle/>
+          <a:p>
+            <a:r>
+              <a:rPr lang="en-CL" sz="3200" dirty="0"/>
+              <a:t>Ocupación N</a:t>
+            </a:r>
+            <a:r>
+              <a:rPr lang="en-US" sz="3200" dirty="0"/>
+              <a:t>a</a:t>
+            </a:r>
+            <a:r>
+              <a:rPr lang="en-CL" sz="3200" dirty="0"/>
+              <a:t>cional de UCI</a:t>
+            </a:r>
+          </a:p>
+        </p:txBody>
+      </p:sp>
       <p:pic>
         <p:nvPicPr>
           <p:cNvPr id="3" name="Picture 2">
             <a:extLst>
               <a:ext uri="{FF2B5EF4-FFF2-40B4-BE49-F238E27FC236}">
-                <a16:creationId xmlns:a16="http://schemas.microsoft.com/office/drawing/2014/main" id="{A8DB5092-DE6E-34C1-816B-6DFD78818BA0}"/>
+                <a16:creationId xmlns:a16="http://schemas.microsoft.com/office/drawing/2014/main" id="{66AF7585-3C16-EF6F-8A4D-D9DDF7337E1B}"/>
               </a:ext>
             </a:extLst>
           </p:cNvPr>
@@ -7084,170 +7120,18 @@
         </p:blipFill>
         <p:spPr>
           <a:xfrm>
-            <a:off x="654833" y="913061"/>
-            <a:ext cx="10161494" cy="5191198"/>
+            <a:off x="1414824" y="774779"/>
+            <a:ext cx="9362351" cy="5780399"/>
           </a:xfrm>
           <a:prstGeom prst="rect">
             <a:avLst/>
           </a:prstGeom>
         </p:spPr>
       </p:pic>
-      <p:sp>
-        <p:nvSpPr>
-          <p:cNvPr id="9" name="TextBox 8">
-            <a:extLst>
-              <a:ext uri="{FF2B5EF4-FFF2-40B4-BE49-F238E27FC236}">
-                <a16:creationId xmlns:a16="http://schemas.microsoft.com/office/drawing/2014/main" id="{22433A70-977D-C840-9BCB-9ECF9B80CB77}"/>
-              </a:ext>
-            </a:extLst>
-          </p:cNvPr>
-          <p:cNvSpPr txBox="1"/>
-          <p:nvPr/>
-        </p:nvSpPr>
-        <p:spPr>
-          <a:xfrm>
-            <a:off x="-73478" y="0"/>
-            <a:ext cx="12338956" cy="569387"/>
-          </a:xfrm>
-          <a:prstGeom prst="rect">
-            <a:avLst/>
-          </a:prstGeom>
-          <a:noFill/>
-        </p:spPr>
-        <p:txBody>
-          <a:bodyPr wrap="square" rtlCol="0">
-            <a:spAutoFit/>
-          </a:bodyPr>
-          <a:lstStyle/>
-          <a:p>
-            <a:pPr algn="ctr"/>
-            <a:r>
-              <a:rPr lang="en-US" sz="3100" dirty="0" err="1"/>
-              <a:t>Nuevas</a:t>
-            </a:r>
-            <a:r>
-              <a:rPr lang="en-US" sz="3100" dirty="0"/>
-              <a:t> </a:t>
-            </a:r>
-            <a:r>
-              <a:rPr lang="en-US" sz="3100" dirty="0" err="1"/>
-              <a:t>vacunas</a:t>
-            </a:r>
-            <a:r>
-              <a:rPr lang="en-US" sz="3100" dirty="0"/>
-              <a:t> </a:t>
-            </a:r>
-            <a:r>
-              <a:rPr lang="en-US" sz="3100" dirty="0" err="1"/>
-              <a:t>semanales</a:t>
-            </a:r>
-            <a:endParaRPr lang="en-US" sz="3100" dirty="0"/>
-          </a:p>
-        </p:txBody>
-      </p:sp>
-      <p:sp>
-        <p:nvSpPr>
-          <p:cNvPr id="5" name="TextBox 4">
-            <a:extLst>
-              <a:ext uri="{FF2B5EF4-FFF2-40B4-BE49-F238E27FC236}">
-                <a16:creationId xmlns:a16="http://schemas.microsoft.com/office/drawing/2014/main" id="{AE60033C-48B3-1E42-A180-100FEDC8D62B}"/>
-              </a:ext>
-            </a:extLst>
-          </p:cNvPr>
-          <p:cNvSpPr txBox="1"/>
-          <p:nvPr/>
-        </p:nvSpPr>
-        <p:spPr>
-          <a:xfrm>
-            <a:off x="160256" y="6447934"/>
-            <a:ext cx="5882188" cy="369332"/>
-          </a:xfrm>
-          <a:prstGeom prst="rect">
-            <a:avLst/>
-          </a:prstGeom>
-          <a:noFill/>
-        </p:spPr>
-        <p:txBody>
-          <a:bodyPr wrap="none" rtlCol="0">
-            <a:spAutoFit/>
-          </a:bodyPr>
-          <a:lstStyle/>
-          <a:p>
-            <a:r>
-              <a:rPr lang="en-US" dirty="0"/>
-              <a:t>Fuente: </a:t>
-            </a:r>
-            <a:r>
-              <a:rPr lang="en-US" dirty="0" err="1"/>
-              <a:t>Repositorio</a:t>
-            </a:r>
-            <a:r>
-              <a:rPr lang="en-US" dirty="0"/>
-              <a:t> de </a:t>
-            </a:r>
-            <a:r>
-              <a:rPr lang="en-US" dirty="0" err="1"/>
-              <a:t>Datos</a:t>
-            </a:r>
-            <a:r>
-              <a:rPr lang="en-US" dirty="0"/>
-              <a:t> COVID19, </a:t>
-            </a:r>
-            <a:r>
-              <a:rPr lang="en-US" dirty="0" err="1"/>
-              <a:t>Ministerio</a:t>
-            </a:r>
-            <a:r>
-              <a:rPr lang="en-US" dirty="0"/>
-              <a:t> de </a:t>
-            </a:r>
-            <a:r>
-              <a:rPr lang="en-US" dirty="0" err="1"/>
-              <a:t>Ciencia</a:t>
-            </a:r>
-            <a:endParaRPr lang="en-US" dirty="0"/>
-          </a:p>
-        </p:txBody>
-      </p:sp>
-      <p:sp>
-        <p:nvSpPr>
-          <p:cNvPr id="2" name="TextBox 1">
-            <a:extLst>
-              <a:ext uri="{FF2B5EF4-FFF2-40B4-BE49-F238E27FC236}">
-                <a16:creationId xmlns:a16="http://schemas.microsoft.com/office/drawing/2014/main" id="{FE913D83-78EC-F64F-98C6-1C151ADBA8A9}"/>
-              </a:ext>
-            </a:extLst>
-          </p:cNvPr>
-          <p:cNvSpPr txBox="1"/>
-          <p:nvPr/>
-        </p:nvSpPr>
-        <p:spPr>
-          <a:xfrm>
-            <a:off x="4751176" y="833401"/>
-            <a:ext cx="1968809" cy="461665"/>
-          </a:xfrm>
-          <a:prstGeom prst="rect">
-            <a:avLst/>
-          </a:prstGeom>
-          <a:noFill/>
-        </p:spPr>
-        <p:txBody>
-          <a:bodyPr wrap="none" rtlCol="0">
-            <a:spAutoFit/>
-          </a:bodyPr>
-          <a:lstStyle/>
-          <a:p>
-            <a:r>
-              <a:rPr lang="en-CL" sz="2400" dirty="0"/>
-              <a:t>18 o más años</a:t>
-            </a:r>
-          </a:p>
-        </p:txBody>
-      </p:sp>
     </p:spTree>
     <p:extLst>
       <p:ext uri="{BB962C8B-B14F-4D97-AF65-F5344CB8AC3E}">
-        <p14:creationId xmlns:p14="http://schemas.microsoft.com/office/powerpoint/2010/main" val="2319474179"/>
+        <p14:creationId xmlns:p14="http://schemas.microsoft.com/office/powerpoint/2010/main" val="696864501"/>
       </p:ext>
     </p:extLst>
   </p:cSld>
@@ -7276,10 +7160,10 @@
       </p:grpSpPr>
       <p:pic>
         <p:nvPicPr>
-          <p:cNvPr id="4" name="Picture 3">
-            <a:extLst>
-              <a:ext uri="{FF2B5EF4-FFF2-40B4-BE49-F238E27FC236}">
-                <a16:creationId xmlns:a16="http://schemas.microsoft.com/office/drawing/2014/main" id="{9EC23C2F-5C57-FCCC-C826-860CB5675732}"/>
+          <p:cNvPr id="3" name="Picture 2">
+            <a:extLst>
+              <a:ext uri="{FF2B5EF4-FFF2-40B4-BE49-F238E27FC236}">
+                <a16:creationId xmlns:a16="http://schemas.microsoft.com/office/drawing/2014/main" id="{A8DB5092-DE6E-34C1-816B-6DFD78818BA0}"/>
               </a:ext>
             </a:extLst>
           </p:cNvPr>
@@ -7296,8 +7180,8 @@
         </p:blipFill>
         <p:spPr>
           <a:xfrm>
-            <a:off x="1197176" y="1019098"/>
-            <a:ext cx="9690529" cy="5415720"/>
+            <a:off x="654833" y="913061"/>
+            <a:ext cx="10161494" cy="5191198"/>
           </a:xfrm>
           <a:prstGeom prst="rect">
             <a:avLst/>
@@ -7318,7 +7202,7 @@
         </p:nvSpPr>
         <p:spPr>
           <a:xfrm>
-            <a:off x="-213426" y="-18007"/>
+            <a:off x="-73478" y="0"/>
             <a:ext cx="12338956" cy="569387"/>
           </a:xfrm>
           <a:prstGeom prst="rect">
@@ -7335,7 +7219,7 @@
             <a:pPr algn="ctr"/>
             <a:r>
               <a:rPr lang="en-US" sz="3100" dirty="0" err="1"/>
-              <a:t>Vacunados</a:t>
+              <a:t>Nuevas</a:t>
             </a:r>
             <a:r>
               <a:rPr lang="en-US" sz="3100" dirty="0"/>
@@ -7343,7 +7227,15 @@
             </a:r>
             <a:r>
               <a:rPr lang="en-US" sz="3100" dirty="0" err="1"/>
-              <a:t>acumulados</a:t>
+              <a:t>vacunas</a:t>
+            </a:r>
+            <a:r>
+              <a:rPr lang="en-US" sz="3100" dirty="0"/>
+              <a:t> </a:t>
+            </a:r>
+            <a:r>
+              <a:rPr lang="en-US" sz="3100" dirty="0" err="1"/>
+              <a:t>semanales</a:t>
             </a:r>
             <a:endParaRPr lang="en-US" sz="3100" dirty="0"/>
           </a:p>
@@ -7427,7 +7319,7 @@
         </p:nvSpPr>
         <p:spPr>
           <a:xfrm>
-            <a:off x="5058037" y="480992"/>
+            <a:off x="4751176" y="833401"/>
             <a:ext cx="1968809" cy="461665"/>
           </a:xfrm>
           <a:prstGeom prst="rect">
@@ -7448,171 +7340,10 @@
           </a:p>
         </p:txBody>
       </p:sp>
-      <p:sp>
-        <p:nvSpPr>
-          <p:cNvPr id="14" name="TextBox 13">
-            <a:extLst>
-              <a:ext uri="{FF2B5EF4-FFF2-40B4-BE49-F238E27FC236}">
-                <a16:creationId xmlns:a16="http://schemas.microsoft.com/office/drawing/2014/main" id="{FC6DD279-501D-B707-9C39-F3A6F17C2452}"/>
-              </a:ext>
-            </a:extLst>
-          </p:cNvPr>
-          <p:cNvSpPr txBox="1"/>
-          <p:nvPr/>
-        </p:nvSpPr>
-        <p:spPr>
-          <a:xfrm>
-            <a:off x="4500690" y="5654236"/>
-            <a:ext cx="1185004" cy="369332"/>
-          </a:xfrm>
-          <a:prstGeom prst="rect">
-            <a:avLst/>
-          </a:prstGeom>
-          <a:noFill/>
-        </p:spPr>
-        <p:txBody>
-          <a:bodyPr wrap="none" rtlCol="0">
-            <a:spAutoFit/>
-          </a:bodyPr>
-          <a:lstStyle/>
-          <a:p>
-            <a:r>
-              <a:rPr lang="en-CL" dirty="0">
-                <a:solidFill>
-                  <a:schemeClr val="bg1"/>
-                </a:solidFill>
-              </a:rPr>
-              <a:t>Refuerzo 1</a:t>
-            </a:r>
-          </a:p>
-        </p:txBody>
-      </p:sp>
-      <p:sp>
-        <p:nvSpPr>
-          <p:cNvPr id="15" name="TextBox 14">
-            <a:extLst>
-              <a:ext uri="{FF2B5EF4-FFF2-40B4-BE49-F238E27FC236}">
-                <a16:creationId xmlns:a16="http://schemas.microsoft.com/office/drawing/2014/main" id="{9BEDAE34-ABB1-A3EF-6DB6-9E6A248BF808}"/>
-              </a:ext>
-            </a:extLst>
-          </p:cNvPr>
-          <p:cNvSpPr txBox="1"/>
-          <p:nvPr/>
-        </p:nvSpPr>
-        <p:spPr>
-          <a:xfrm>
-            <a:off x="8763577" y="5654236"/>
-            <a:ext cx="1185004" cy="369332"/>
-          </a:xfrm>
-          <a:prstGeom prst="rect">
-            <a:avLst/>
-          </a:prstGeom>
-          <a:noFill/>
-        </p:spPr>
-        <p:txBody>
-          <a:bodyPr wrap="none" rtlCol="0">
-            <a:spAutoFit/>
-          </a:bodyPr>
-          <a:lstStyle/>
-          <a:p>
-            <a:r>
-              <a:rPr lang="en-CL" dirty="0">
-                <a:solidFill>
-                  <a:schemeClr val="bg1"/>
-                </a:solidFill>
-              </a:rPr>
-              <a:t>Refuerzo 2</a:t>
-            </a:r>
-          </a:p>
-        </p:txBody>
-      </p:sp>
-      <p:cxnSp>
-        <p:nvCxnSpPr>
-          <p:cNvPr id="16" name="Straight Arrow Connector 15">
-            <a:extLst>
-              <a:ext uri="{FF2B5EF4-FFF2-40B4-BE49-F238E27FC236}">
-                <a16:creationId xmlns:a16="http://schemas.microsoft.com/office/drawing/2014/main" id="{8ADC1E4A-8B06-707A-CD4B-F9DD4A188CF4}"/>
-              </a:ext>
-            </a:extLst>
-          </p:cNvPr>
-          <p:cNvCxnSpPr>
-            <a:cxnSpLocks/>
-          </p:cNvCxnSpPr>
-          <p:nvPr/>
-        </p:nvCxnSpPr>
-        <p:spPr>
-          <a:xfrm>
-            <a:off x="5344411" y="3653913"/>
-            <a:ext cx="4864280" cy="0"/>
-          </a:xfrm>
-          <a:prstGeom prst="straightConnector1">
-            <a:avLst/>
-          </a:prstGeom>
-          <a:ln w="28575">
-            <a:solidFill>
-              <a:schemeClr val="bg1"/>
-            </a:solidFill>
-            <a:tailEnd type="triangle"/>
-          </a:ln>
-        </p:spPr>
-        <p:style>
-          <a:lnRef idx="1">
-            <a:schemeClr val="accent1"/>
-          </a:lnRef>
-          <a:fillRef idx="0">
-            <a:schemeClr val="accent1"/>
-          </a:fillRef>
-          <a:effectRef idx="0">
-            <a:schemeClr val="accent1"/>
-          </a:effectRef>
-          <a:fontRef idx="minor">
-            <a:schemeClr val="tx1"/>
-          </a:fontRef>
-        </p:style>
-      </p:cxnSp>
-      <p:sp>
-        <p:nvSpPr>
-          <p:cNvPr id="20" name="TextBox 19">
-            <a:extLst>
-              <a:ext uri="{FF2B5EF4-FFF2-40B4-BE49-F238E27FC236}">
-                <a16:creationId xmlns:a16="http://schemas.microsoft.com/office/drawing/2014/main" id="{2793D381-E9F8-5BEA-A634-987FFD537FB5}"/>
-              </a:ext>
-            </a:extLst>
-          </p:cNvPr>
-          <p:cNvSpPr txBox="1"/>
-          <p:nvPr/>
-        </p:nvSpPr>
-        <p:spPr>
-          <a:xfrm>
-            <a:off x="7071225" y="3346136"/>
-            <a:ext cx="779381" cy="307777"/>
-          </a:xfrm>
-          <a:prstGeom prst="rect">
-            <a:avLst/>
-          </a:prstGeom>
-          <a:noFill/>
-        </p:spPr>
-        <p:txBody>
-          <a:bodyPr wrap="none" rtlCol="0">
-            <a:spAutoFit/>
-          </a:bodyPr>
-          <a:lstStyle/>
-          <a:p>
-            <a:r>
-              <a:rPr lang="en-CL" sz="1400" dirty="0">
-                <a:solidFill>
-                  <a:schemeClr val="bg1"/>
-                </a:solidFill>
-              </a:rPr>
-              <a:t>6 meses</a:t>
-            </a:r>
-          </a:p>
-        </p:txBody>
-      </p:sp>
     </p:spTree>
     <p:extLst>
       <p:ext uri="{BB962C8B-B14F-4D97-AF65-F5344CB8AC3E}">
-        <p14:creationId xmlns:p14="http://schemas.microsoft.com/office/powerpoint/2010/main" val="3001554487"/>
+        <p14:creationId xmlns:p14="http://schemas.microsoft.com/office/powerpoint/2010/main" val="2319474179"/>
       </p:ext>
     </p:extLst>
   </p:cSld>
@@ -7639,51 +7370,12 @@
           <a:chExt cx="0" cy="0"/>
         </a:xfrm>
       </p:grpSpPr>
-      <p:sp>
-        <p:nvSpPr>
-          <p:cNvPr id="3" name="TextBox 2">
-            <a:extLst>
-              <a:ext uri="{FF2B5EF4-FFF2-40B4-BE49-F238E27FC236}">
-                <a16:creationId xmlns:a16="http://schemas.microsoft.com/office/drawing/2014/main" id="{1BFE40F7-FB73-FEAE-B569-AB700FD1A2C9}"/>
-              </a:ext>
-            </a:extLst>
-          </p:cNvPr>
-          <p:cNvSpPr txBox="1"/>
-          <p:nvPr/>
-        </p:nvSpPr>
-        <p:spPr>
-          <a:xfrm>
-            <a:off x="2236610" y="0"/>
-            <a:ext cx="7718780" cy="584775"/>
-          </a:xfrm>
-          <a:prstGeom prst="rect">
-            <a:avLst/>
-          </a:prstGeom>
-          <a:noFill/>
-        </p:spPr>
-        <p:txBody>
-          <a:bodyPr wrap="none" rtlCol="0">
-            <a:spAutoFit/>
-          </a:bodyPr>
-          <a:lstStyle/>
-          <a:p>
-            <a:r>
-              <a:rPr lang="en-CL" sz="3200" dirty="0"/>
-              <a:t>Cobertura de vacunación </a:t>
-            </a:r>
-            <a:r>
-              <a:rPr lang="en-CL" sz="3200" b="1" dirty="0"/>
-              <a:t>en últimos 6 meses</a:t>
-            </a:r>
-          </a:p>
-        </p:txBody>
-      </p:sp>
       <p:pic>
         <p:nvPicPr>
-          <p:cNvPr id="2" name="Picture 1">
-            <a:extLst>
-              <a:ext uri="{FF2B5EF4-FFF2-40B4-BE49-F238E27FC236}">
-                <a16:creationId xmlns:a16="http://schemas.microsoft.com/office/drawing/2014/main" id="{0707EAD7-EED7-3998-F320-FF4FA068A512}"/>
+          <p:cNvPr id="4" name="Picture 3">
+            <a:extLst>
+              <a:ext uri="{FF2B5EF4-FFF2-40B4-BE49-F238E27FC236}">
+                <a16:creationId xmlns:a16="http://schemas.microsoft.com/office/drawing/2014/main" id="{9EC23C2F-5C57-FCCC-C826-860CB5675732}"/>
               </a:ext>
             </a:extLst>
           </p:cNvPr>
@@ -7700,18 +7392,323 @@
         </p:blipFill>
         <p:spPr>
           <a:xfrm>
-            <a:off x="1648831" y="584775"/>
-            <a:ext cx="8894337" cy="5911028"/>
+            <a:off x="1197176" y="1019098"/>
+            <a:ext cx="9690529" cy="5415720"/>
           </a:xfrm>
           <a:prstGeom prst="rect">
             <a:avLst/>
           </a:prstGeom>
         </p:spPr>
       </p:pic>
+      <p:sp>
+        <p:nvSpPr>
+          <p:cNvPr id="9" name="TextBox 8">
+            <a:extLst>
+              <a:ext uri="{FF2B5EF4-FFF2-40B4-BE49-F238E27FC236}">
+                <a16:creationId xmlns:a16="http://schemas.microsoft.com/office/drawing/2014/main" id="{22433A70-977D-C840-9BCB-9ECF9B80CB77}"/>
+              </a:ext>
+            </a:extLst>
+          </p:cNvPr>
+          <p:cNvSpPr txBox="1"/>
+          <p:nvPr/>
+        </p:nvSpPr>
+        <p:spPr>
+          <a:xfrm>
+            <a:off x="-213426" y="-18007"/>
+            <a:ext cx="12338956" cy="569387"/>
+          </a:xfrm>
+          <a:prstGeom prst="rect">
+            <a:avLst/>
+          </a:prstGeom>
+          <a:noFill/>
+        </p:spPr>
+        <p:txBody>
+          <a:bodyPr wrap="square" rtlCol="0">
+            <a:spAutoFit/>
+          </a:bodyPr>
+          <a:lstStyle/>
+          <a:p>
+            <a:pPr algn="ctr"/>
+            <a:r>
+              <a:rPr lang="en-US" sz="3100" dirty="0" err="1"/>
+              <a:t>Vacunados</a:t>
+            </a:r>
+            <a:r>
+              <a:rPr lang="en-US" sz="3100" dirty="0"/>
+              <a:t> </a:t>
+            </a:r>
+            <a:r>
+              <a:rPr lang="en-US" sz="3100" dirty="0" err="1"/>
+              <a:t>acumulados</a:t>
+            </a:r>
+            <a:endParaRPr lang="en-US" sz="3100" dirty="0"/>
+          </a:p>
+        </p:txBody>
+      </p:sp>
+      <p:sp>
+        <p:nvSpPr>
+          <p:cNvPr id="5" name="TextBox 4">
+            <a:extLst>
+              <a:ext uri="{FF2B5EF4-FFF2-40B4-BE49-F238E27FC236}">
+                <a16:creationId xmlns:a16="http://schemas.microsoft.com/office/drawing/2014/main" id="{AE60033C-48B3-1E42-A180-100FEDC8D62B}"/>
+              </a:ext>
+            </a:extLst>
+          </p:cNvPr>
+          <p:cNvSpPr txBox="1"/>
+          <p:nvPr/>
+        </p:nvSpPr>
+        <p:spPr>
+          <a:xfrm>
+            <a:off x="160256" y="6447934"/>
+            <a:ext cx="5882188" cy="369332"/>
+          </a:xfrm>
+          <a:prstGeom prst="rect">
+            <a:avLst/>
+          </a:prstGeom>
+          <a:noFill/>
+        </p:spPr>
+        <p:txBody>
+          <a:bodyPr wrap="none" rtlCol="0">
+            <a:spAutoFit/>
+          </a:bodyPr>
+          <a:lstStyle/>
+          <a:p>
+            <a:r>
+              <a:rPr lang="en-US" dirty="0"/>
+              <a:t>Fuente: </a:t>
+            </a:r>
+            <a:r>
+              <a:rPr lang="en-US" dirty="0" err="1"/>
+              <a:t>Repositorio</a:t>
+            </a:r>
+            <a:r>
+              <a:rPr lang="en-US" dirty="0"/>
+              <a:t> de </a:t>
+            </a:r>
+            <a:r>
+              <a:rPr lang="en-US" dirty="0" err="1"/>
+              <a:t>Datos</a:t>
+            </a:r>
+            <a:r>
+              <a:rPr lang="en-US" dirty="0"/>
+              <a:t> COVID19, </a:t>
+            </a:r>
+            <a:r>
+              <a:rPr lang="en-US" dirty="0" err="1"/>
+              <a:t>Ministerio</a:t>
+            </a:r>
+            <a:r>
+              <a:rPr lang="en-US" dirty="0"/>
+              <a:t> de </a:t>
+            </a:r>
+            <a:r>
+              <a:rPr lang="en-US" dirty="0" err="1"/>
+              <a:t>Ciencia</a:t>
+            </a:r>
+            <a:endParaRPr lang="en-US" dirty="0"/>
+          </a:p>
+        </p:txBody>
+      </p:sp>
+      <p:sp>
+        <p:nvSpPr>
+          <p:cNvPr id="2" name="TextBox 1">
+            <a:extLst>
+              <a:ext uri="{FF2B5EF4-FFF2-40B4-BE49-F238E27FC236}">
+                <a16:creationId xmlns:a16="http://schemas.microsoft.com/office/drawing/2014/main" id="{FE913D83-78EC-F64F-98C6-1C151ADBA8A9}"/>
+              </a:ext>
+            </a:extLst>
+          </p:cNvPr>
+          <p:cNvSpPr txBox="1"/>
+          <p:nvPr/>
+        </p:nvSpPr>
+        <p:spPr>
+          <a:xfrm>
+            <a:off x="5058037" y="480992"/>
+            <a:ext cx="1968809" cy="461665"/>
+          </a:xfrm>
+          <a:prstGeom prst="rect">
+            <a:avLst/>
+          </a:prstGeom>
+          <a:noFill/>
+        </p:spPr>
+        <p:txBody>
+          <a:bodyPr wrap="none" rtlCol="0">
+            <a:spAutoFit/>
+          </a:bodyPr>
+          <a:lstStyle/>
+          <a:p>
+            <a:r>
+              <a:rPr lang="en-CL" sz="2400" dirty="0"/>
+              <a:t>18 o más años</a:t>
+            </a:r>
+          </a:p>
+        </p:txBody>
+      </p:sp>
+      <p:sp>
+        <p:nvSpPr>
+          <p:cNvPr id="14" name="TextBox 13">
+            <a:extLst>
+              <a:ext uri="{FF2B5EF4-FFF2-40B4-BE49-F238E27FC236}">
+                <a16:creationId xmlns:a16="http://schemas.microsoft.com/office/drawing/2014/main" id="{FC6DD279-501D-B707-9C39-F3A6F17C2452}"/>
+              </a:ext>
+            </a:extLst>
+          </p:cNvPr>
+          <p:cNvSpPr txBox="1"/>
+          <p:nvPr/>
+        </p:nvSpPr>
+        <p:spPr>
+          <a:xfrm>
+            <a:off x="4500690" y="5654236"/>
+            <a:ext cx="1185004" cy="369332"/>
+          </a:xfrm>
+          <a:prstGeom prst="rect">
+            <a:avLst/>
+          </a:prstGeom>
+          <a:noFill/>
+        </p:spPr>
+        <p:txBody>
+          <a:bodyPr wrap="none" rtlCol="0">
+            <a:spAutoFit/>
+          </a:bodyPr>
+          <a:lstStyle/>
+          <a:p>
+            <a:r>
+              <a:rPr lang="en-CL" dirty="0">
+                <a:solidFill>
+                  <a:schemeClr val="bg1"/>
+                </a:solidFill>
+              </a:rPr>
+              <a:t>Refuerzo 1</a:t>
+            </a:r>
+          </a:p>
+        </p:txBody>
+      </p:sp>
+      <p:sp>
+        <p:nvSpPr>
+          <p:cNvPr id="15" name="TextBox 14">
+            <a:extLst>
+              <a:ext uri="{FF2B5EF4-FFF2-40B4-BE49-F238E27FC236}">
+                <a16:creationId xmlns:a16="http://schemas.microsoft.com/office/drawing/2014/main" id="{9BEDAE34-ABB1-A3EF-6DB6-9E6A248BF808}"/>
+              </a:ext>
+            </a:extLst>
+          </p:cNvPr>
+          <p:cNvSpPr txBox="1"/>
+          <p:nvPr/>
+        </p:nvSpPr>
+        <p:spPr>
+          <a:xfrm>
+            <a:off x="8763577" y="5654236"/>
+            <a:ext cx="1185004" cy="369332"/>
+          </a:xfrm>
+          <a:prstGeom prst="rect">
+            <a:avLst/>
+          </a:prstGeom>
+          <a:noFill/>
+        </p:spPr>
+        <p:txBody>
+          <a:bodyPr wrap="none" rtlCol="0">
+            <a:spAutoFit/>
+          </a:bodyPr>
+          <a:lstStyle/>
+          <a:p>
+            <a:r>
+              <a:rPr lang="en-CL" dirty="0">
+                <a:solidFill>
+                  <a:schemeClr val="bg1"/>
+                </a:solidFill>
+              </a:rPr>
+              <a:t>Refuerzo 2</a:t>
+            </a:r>
+          </a:p>
+        </p:txBody>
+      </p:sp>
+      <p:cxnSp>
+        <p:nvCxnSpPr>
+          <p:cNvPr id="16" name="Straight Arrow Connector 15">
+            <a:extLst>
+              <a:ext uri="{FF2B5EF4-FFF2-40B4-BE49-F238E27FC236}">
+                <a16:creationId xmlns:a16="http://schemas.microsoft.com/office/drawing/2014/main" id="{8ADC1E4A-8B06-707A-CD4B-F9DD4A188CF4}"/>
+              </a:ext>
+            </a:extLst>
+          </p:cNvPr>
+          <p:cNvCxnSpPr>
+            <a:cxnSpLocks/>
+          </p:cNvCxnSpPr>
+          <p:nvPr/>
+        </p:nvCxnSpPr>
+        <p:spPr>
+          <a:xfrm>
+            <a:off x="5344411" y="3653913"/>
+            <a:ext cx="4864280" cy="0"/>
+          </a:xfrm>
+          <a:prstGeom prst="straightConnector1">
+            <a:avLst/>
+          </a:prstGeom>
+          <a:ln w="28575">
+            <a:solidFill>
+              <a:schemeClr val="bg1"/>
+            </a:solidFill>
+            <a:tailEnd type="triangle"/>
+          </a:ln>
+        </p:spPr>
+        <p:style>
+          <a:lnRef idx="1">
+            <a:schemeClr val="accent1"/>
+          </a:lnRef>
+          <a:fillRef idx="0">
+            <a:schemeClr val="accent1"/>
+          </a:fillRef>
+          <a:effectRef idx="0">
+            <a:schemeClr val="accent1"/>
+          </a:effectRef>
+          <a:fontRef idx="minor">
+            <a:schemeClr val="tx1"/>
+          </a:fontRef>
+        </p:style>
+      </p:cxnSp>
+      <p:sp>
+        <p:nvSpPr>
+          <p:cNvPr id="20" name="TextBox 19">
+            <a:extLst>
+              <a:ext uri="{FF2B5EF4-FFF2-40B4-BE49-F238E27FC236}">
+                <a16:creationId xmlns:a16="http://schemas.microsoft.com/office/drawing/2014/main" id="{2793D381-E9F8-5BEA-A634-987FFD537FB5}"/>
+              </a:ext>
+            </a:extLst>
+          </p:cNvPr>
+          <p:cNvSpPr txBox="1"/>
+          <p:nvPr/>
+        </p:nvSpPr>
+        <p:spPr>
+          <a:xfrm>
+            <a:off x="7071225" y="3346136"/>
+            <a:ext cx="779381" cy="307777"/>
+          </a:xfrm>
+          <a:prstGeom prst="rect">
+            <a:avLst/>
+          </a:prstGeom>
+          <a:noFill/>
+        </p:spPr>
+        <p:txBody>
+          <a:bodyPr wrap="none" rtlCol="0">
+            <a:spAutoFit/>
+          </a:bodyPr>
+          <a:lstStyle/>
+          <a:p>
+            <a:r>
+              <a:rPr lang="en-CL" sz="1400" dirty="0">
+                <a:solidFill>
+                  <a:schemeClr val="bg1"/>
+                </a:solidFill>
+              </a:rPr>
+              <a:t>6 meses</a:t>
+            </a:r>
+          </a:p>
+        </p:txBody>
+      </p:sp>
     </p:spTree>
     <p:extLst>
       <p:ext uri="{BB962C8B-B14F-4D97-AF65-F5344CB8AC3E}">
-        <p14:creationId xmlns:p14="http://schemas.microsoft.com/office/powerpoint/2010/main" val="58329169"/>
+        <p14:creationId xmlns:p14="http://schemas.microsoft.com/office/powerpoint/2010/main" val="3001554487"/>
       </p:ext>
     </p:extLst>
   </p:cSld>
@@ -7740,6 +7737,105 @@
       </p:grpSpPr>
       <p:sp>
         <p:nvSpPr>
+          <p:cNvPr id="3" name="TextBox 2">
+            <a:extLst>
+              <a:ext uri="{FF2B5EF4-FFF2-40B4-BE49-F238E27FC236}">
+                <a16:creationId xmlns:a16="http://schemas.microsoft.com/office/drawing/2014/main" id="{1BFE40F7-FB73-FEAE-B569-AB700FD1A2C9}"/>
+              </a:ext>
+            </a:extLst>
+          </p:cNvPr>
+          <p:cNvSpPr txBox="1"/>
+          <p:nvPr/>
+        </p:nvSpPr>
+        <p:spPr>
+          <a:xfrm>
+            <a:off x="2236610" y="0"/>
+            <a:ext cx="7718780" cy="584775"/>
+          </a:xfrm>
+          <a:prstGeom prst="rect">
+            <a:avLst/>
+          </a:prstGeom>
+          <a:noFill/>
+        </p:spPr>
+        <p:txBody>
+          <a:bodyPr wrap="none" rtlCol="0">
+            <a:spAutoFit/>
+          </a:bodyPr>
+          <a:lstStyle/>
+          <a:p>
+            <a:r>
+              <a:rPr lang="en-CL" sz="3200" dirty="0"/>
+              <a:t>Cobertura de vacunación </a:t>
+            </a:r>
+            <a:r>
+              <a:rPr lang="en-CL" sz="3200" b="1" dirty="0"/>
+              <a:t>en últimos 6 meses</a:t>
+            </a:r>
+          </a:p>
+        </p:txBody>
+      </p:sp>
+      <p:pic>
+        <p:nvPicPr>
+          <p:cNvPr id="2" name="Picture 1">
+            <a:extLst>
+              <a:ext uri="{FF2B5EF4-FFF2-40B4-BE49-F238E27FC236}">
+                <a16:creationId xmlns:a16="http://schemas.microsoft.com/office/drawing/2014/main" id="{0707EAD7-EED7-3998-F320-FF4FA068A512}"/>
+              </a:ext>
+            </a:extLst>
+          </p:cNvPr>
+          <p:cNvPicPr>
+            <a:picLocks noChangeAspect="1"/>
+          </p:cNvPicPr>
+          <p:nvPr/>
+        </p:nvPicPr>
+        <p:blipFill>
+          <a:blip r:embed="rId2"/>
+          <a:stretch>
+            <a:fillRect/>
+          </a:stretch>
+        </p:blipFill>
+        <p:spPr>
+          <a:xfrm>
+            <a:off x="1648831" y="584775"/>
+            <a:ext cx="8894337" cy="5911028"/>
+          </a:xfrm>
+          <a:prstGeom prst="rect">
+            <a:avLst/>
+          </a:prstGeom>
+        </p:spPr>
+      </p:pic>
+    </p:spTree>
+    <p:extLst>
+      <p:ext uri="{BB962C8B-B14F-4D97-AF65-F5344CB8AC3E}">
+        <p14:creationId xmlns:p14="http://schemas.microsoft.com/office/powerpoint/2010/main" val="58329169"/>
+      </p:ext>
+    </p:extLst>
+  </p:cSld>
+  <p:clrMapOvr>
+    <a:masterClrMapping/>
+  </p:clrMapOvr>
+</p:sld>
+</file>
+
+<file path=ppt/slides/slide27.xml><?xml version="1.0" encoding="utf-8"?>
+<p:sld xmlns:a="http://schemas.openxmlformats.org/drawingml/2006/main" xmlns:r="http://schemas.openxmlformats.org/officeDocument/2006/relationships" xmlns:p="http://schemas.openxmlformats.org/presentationml/2006/main">
+  <p:cSld>
+    <p:spTree>
+      <p:nvGrpSpPr>
+        <p:cNvPr id="1" name=""/>
+        <p:cNvGrpSpPr/>
+        <p:nvPr/>
+      </p:nvGrpSpPr>
+      <p:grpSpPr>
+        <a:xfrm>
+          <a:off x="0" y="0"/>
+          <a:ext cx="0" cy="0"/>
+          <a:chOff x="0" y="0"/>
+          <a:chExt cx="0" cy="0"/>
+        </a:xfrm>
+      </p:grpSpPr>
+      <p:sp>
+        <p:nvSpPr>
           <p:cNvPr id="4" name="Title 3">
             <a:extLst>
               <a:ext uri="{FF2B5EF4-FFF2-40B4-BE49-F238E27FC236}">
@@ -7811,7 +7907,7 @@
 </p:sld>
 </file>
 
-<file path=ppt/slides/slide27.xml><?xml version="1.0" encoding="utf-8"?>
+<file path=ppt/slides/slide28.xml><?xml version="1.0" encoding="utf-8"?>
 <p:sld xmlns:a="http://schemas.openxmlformats.org/drawingml/2006/main" xmlns:r="http://schemas.openxmlformats.org/officeDocument/2006/relationships" xmlns:p="http://schemas.openxmlformats.org/presentationml/2006/main">
   <p:cSld>
     <p:spTree>

</xml_diff>